<commit_message>
Scaling R_0 by LVweight
</commit_message>
<xml_diff>
--- a/Coronary/Presentation 05172022.pptx
+++ b/Coronary/Presentation 05172022.pptx
@@ -6,11 +6,12 @@
   </p:sldMasterIdLst>
   <p:sldIdLst>
     <p:sldId id="262" r:id="rId2"/>
-    <p:sldId id="263" r:id="rId3"/>
-    <p:sldId id="264" r:id="rId4"/>
+    <p:sldId id="264" r:id="rId3"/>
+    <p:sldId id="263" r:id="rId4"/>
     <p:sldId id="258" r:id="rId5"/>
     <p:sldId id="259" r:id="rId6"/>
     <p:sldId id="260" r:id="rId7"/>
+    <p:sldId id="265" r:id="rId8"/>
   </p:sldIdLst>
   <p:sldSz cx="12192000" cy="6858000"/>
   <p:notesSz cx="6858000" cy="9144000"/>
@@ -109,6 +110,11 @@
       </a:defRPr>
     </a:lvl9pPr>
   </p:defaultTextStyle>
+  <p:extLst>
+    <p:ext uri="{EFAFB233-063F-42B5-8137-9DF3F51BA10A}">
+      <p15:sldGuideLst xmlns:p15="http://schemas.microsoft.com/office/powerpoint/2012/main"/>
+    </p:ext>
+  </p:extLst>
 </p:presentation>
 </file>
 
@@ -259,7 +265,7 @@
           <a:p>
             <a:fld id="{0141B08B-1CB8-854F-8D2C-C02119586515}" type="datetimeFigureOut">
               <a:rPr lang="en-US" smtClean="0"/>
-              <a:t>5/17/22</a:t>
+              <a:t>9/6/22</a:t>
             </a:fld>
             <a:endParaRPr lang="en-US"/>
           </a:p>
@@ -457,7 +463,7 @@
           <a:p>
             <a:fld id="{0141B08B-1CB8-854F-8D2C-C02119586515}" type="datetimeFigureOut">
               <a:rPr lang="en-US" smtClean="0"/>
-              <a:t>5/17/22</a:t>
+              <a:t>9/6/22</a:t>
             </a:fld>
             <a:endParaRPr lang="en-US"/>
           </a:p>
@@ -665,7 +671,7 @@
           <a:p>
             <a:fld id="{0141B08B-1CB8-854F-8D2C-C02119586515}" type="datetimeFigureOut">
               <a:rPr lang="en-US" smtClean="0"/>
-              <a:t>5/17/22</a:t>
+              <a:t>9/6/22</a:t>
             </a:fld>
             <a:endParaRPr lang="en-US"/>
           </a:p>
@@ -863,7 +869,7 @@
           <a:p>
             <a:fld id="{0141B08B-1CB8-854F-8D2C-C02119586515}" type="datetimeFigureOut">
               <a:rPr lang="en-US" smtClean="0"/>
-              <a:t>5/17/22</a:t>
+              <a:t>9/6/22</a:t>
             </a:fld>
             <a:endParaRPr lang="en-US"/>
           </a:p>
@@ -1138,7 +1144,7 @@
           <a:p>
             <a:fld id="{0141B08B-1CB8-854F-8D2C-C02119586515}" type="datetimeFigureOut">
               <a:rPr lang="en-US" smtClean="0"/>
-              <a:t>5/17/22</a:t>
+              <a:t>9/6/22</a:t>
             </a:fld>
             <a:endParaRPr lang="en-US"/>
           </a:p>
@@ -1403,7 +1409,7 @@
           <a:p>
             <a:fld id="{0141B08B-1CB8-854F-8D2C-C02119586515}" type="datetimeFigureOut">
               <a:rPr lang="en-US" smtClean="0"/>
-              <a:t>5/17/22</a:t>
+              <a:t>9/6/22</a:t>
             </a:fld>
             <a:endParaRPr lang="en-US"/>
           </a:p>
@@ -1815,7 +1821,7 @@
           <a:p>
             <a:fld id="{0141B08B-1CB8-854F-8D2C-C02119586515}" type="datetimeFigureOut">
               <a:rPr lang="en-US" smtClean="0"/>
-              <a:t>5/17/22</a:t>
+              <a:t>9/6/22</a:t>
             </a:fld>
             <a:endParaRPr lang="en-US"/>
           </a:p>
@@ -1956,7 +1962,7 @@
           <a:p>
             <a:fld id="{0141B08B-1CB8-854F-8D2C-C02119586515}" type="datetimeFigureOut">
               <a:rPr lang="en-US" smtClean="0"/>
-              <a:t>5/17/22</a:t>
+              <a:t>9/6/22</a:t>
             </a:fld>
             <a:endParaRPr lang="en-US"/>
           </a:p>
@@ -2069,7 +2075,7 @@
           <a:p>
             <a:fld id="{0141B08B-1CB8-854F-8D2C-C02119586515}" type="datetimeFigureOut">
               <a:rPr lang="en-US" smtClean="0"/>
-              <a:t>5/17/22</a:t>
+              <a:t>9/6/22</a:t>
             </a:fld>
             <a:endParaRPr lang="en-US"/>
           </a:p>
@@ -2380,7 +2386,7 @@
           <a:p>
             <a:fld id="{0141B08B-1CB8-854F-8D2C-C02119586515}" type="datetimeFigureOut">
               <a:rPr lang="en-US" smtClean="0"/>
-              <a:t>5/17/22</a:t>
+              <a:t>9/6/22</a:t>
             </a:fld>
             <a:endParaRPr lang="en-US"/>
           </a:p>
@@ -2668,7 +2674,7 @@
           <a:p>
             <a:fld id="{0141B08B-1CB8-854F-8D2C-C02119586515}" type="datetimeFigureOut">
               <a:rPr lang="en-US" smtClean="0"/>
-              <a:t>5/17/22</a:t>
+              <a:t>9/6/22</a:t>
             </a:fld>
             <a:endParaRPr lang="en-US"/>
           </a:p>
@@ -2909,7 +2915,7 @@
           <a:p>
             <a:fld id="{0141B08B-1CB8-854F-8D2C-C02119586515}" type="datetimeFigureOut">
               <a:rPr lang="en-US" smtClean="0"/>
-              <a:t>5/17/22</a:t>
+              <a:t>9/6/22</a:t>
             </a:fld>
             <a:endParaRPr lang="en-US"/>
           </a:p>
@@ -3509,200 +3515,90 @@
       </p:grpSpPr>
       <p:pic>
         <p:nvPicPr>
-          <p:cNvPr id="7" name="Picture 6">
-            <a:extLst>
-              <a:ext uri="{FF2B5EF4-FFF2-40B4-BE49-F238E27FC236}">
-                <a16:creationId xmlns:a16="http://schemas.microsoft.com/office/drawing/2014/main" id="{338F4BED-8F99-0AB2-2F0C-1A32CF170C18}"/>
+          <p:cNvPr id="3" name="Picture 2" descr="Diagram, schematic&#10;&#10;Description automatically generated">
+            <a:extLst>
+              <a:ext uri="{FF2B5EF4-FFF2-40B4-BE49-F238E27FC236}">
+                <a16:creationId xmlns:a16="http://schemas.microsoft.com/office/drawing/2014/main" id="{2A79ABB7-BC69-CEE7-6A8D-09EFF8E88D8E}"/>
               </a:ext>
             </a:extLst>
           </p:cNvPr>
           <p:cNvPicPr>
-            <a:picLocks/>
+            <a:picLocks noChangeAspect="1"/>
           </p:cNvPicPr>
           <p:nvPr/>
         </p:nvPicPr>
         <p:blipFill>
           <a:blip r:embed="rId2"/>
-          <a:srcRect/>
-          <a:stretch/>
+          <a:stretch>
+            <a:fillRect/>
+          </a:stretch>
         </p:blipFill>
         <p:spPr>
           <a:xfrm>
-            <a:off x="1795922" y="643467"/>
-            <a:ext cx="3390955" cy="2543216"/>
+            <a:off x="0" y="670857"/>
+            <a:ext cx="12192000" cy="5516286"/>
           </a:xfrm>
           <a:prstGeom prst="rect">
             <a:avLst/>
           </a:prstGeom>
         </p:spPr>
       </p:pic>
-      <p:pic>
-        <p:nvPicPr>
-          <p:cNvPr id="3" name="Picture 2">
-            <a:extLst>
-              <a:ext uri="{FF2B5EF4-FFF2-40B4-BE49-F238E27FC236}">
-                <a16:creationId xmlns:a16="http://schemas.microsoft.com/office/drawing/2014/main" id="{262915D0-861F-372D-5120-913E023C24C6}"/>
-              </a:ext>
-            </a:extLst>
-          </p:cNvPr>
-          <p:cNvPicPr>
-            <a:picLocks/>
-          </p:cNvPicPr>
+      <p:sp>
+        <p:nvSpPr>
+          <p:cNvPr id="4" name="Oval 3">
+            <a:extLst>
+              <a:ext uri="{FF2B5EF4-FFF2-40B4-BE49-F238E27FC236}">
+                <a16:creationId xmlns:a16="http://schemas.microsoft.com/office/drawing/2014/main" id="{94485A85-A2C9-0290-AAD2-C6FDD21AED84}"/>
+              </a:ext>
+            </a:extLst>
+          </p:cNvPr>
+          <p:cNvSpPr/>
           <p:nvPr/>
-        </p:nvPicPr>
-        <p:blipFill>
-          <a:blip r:embed="rId3"/>
-          <a:srcRect/>
-          <a:stretch/>
-        </p:blipFill>
-        <p:spPr>
-          <a:xfrm>
-            <a:off x="7009308" y="643467"/>
-            <a:ext cx="3390955" cy="2543216"/>
-          </a:xfrm>
-          <a:prstGeom prst="rect">
-            <a:avLst/>
-          </a:prstGeom>
-        </p:spPr>
-      </p:pic>
-      <p:pic>
-        <p:nvPicPr>
-          <p:cNvPr id="5" name="Picture 4">
-            <a:extLst>
-              <a:ext uri="{FF2B5EF4-FFF2-40B4-BE49-F238E27FC236}">
-                <a16:creationId xmlns:a16="http://schemas.microsoft.com/office/drawing/2014/main" id="{35D27811-CB6F-F3DE-1A30-2A4D84BF31BF}"/>
-              </a:ext>
-            </a:extLst>
-          </p:cNvPr>
-          <p:cNvPicPr>
-            <a:picLocks/>
-          </p:cNvPicPr>
-          <p:nvPr/>
-        </p:nvPicPr>
-        <p:blipFill>
-          <a:blip r:embed="rId4"/>
-          <a:srcRect/>
-          <a:stretch/>
-        </p:blipFill>
-        <p:spPr>
-          <a:xfrm>
-            <a:off x="1794159" y="3671317"/>
-            <a:ext cx="3394481" cy="2545860"/>
-          </a:xfrm>
-          <a:prstGeom prst="rect">
-            <a:avLst/>
-          </a:prstGeom>
-        </p:spPr>
-      </p:pic>
-      <p:pic>
-        <p:nvPicPr>
-          <p:cNvPr id="9" name="Picture 8">
-            <a:extLst>
-              <a:ext uri="{FF2B5EF4-FFF2-40B4-BE49-F238E27FC236}">
-                <a16:creationId xmlns:a16="http://schemas.microsoft.com/office/drawing/2014/main" id="{BAE6C7EC-9FB8-879D-1DF9-9E3E92DCE680}"/>
-              </a:ext>
-            </a:extLst>
-          </p:cNvPr>
-          <p:cNvPicPr>
-            <a:picLocks/>
-          </p:cNvPicPr>
-          <p:nvPr/>
-        </p:nvPicPr>
-        <p:blipFill>
-          <a:blip r:embed="rId5"/>
-          <a:srcRect/>
-          <a:stretch/>
-        </p:blipFill>
-        <p:spPr>
-          <a:xfrm>
-            <a:off x="7002474" y="3671316"/>
-            <a:ext cx="3404624" cy="2553468"/>
-          </a:xfrm>
-          <a:prstGeom prst="rect">
-            <a:avLst/>
-          </a:prstGeom>
-        </p:spPr>
-      </p:pic>
-      <p:sp>
-        <p:nvSpPr>
-          <p:cNvPr id="2" name="TextBox 1">
-            <a:extLst>
-              <a:ext uri="{FF2B5EF4-FFF2-40B4-BE49-F238E27FC236}">
-                <a16:creationId xmlns:a16="http://schemas.microsoft.com/office/drawing/2014/main" id="{48656F87-E8D8-60BD-863E-9FC98FF15636}"/>
-              </a:ext>
-            </a:extLst>
-          </p:cNvPr>
-          <p:cNvSpPr txBox="1"/>
-          <p:nvPr/>
-        </p:nvSpPr>
-        <p:spPr>
-          <a:xfrm>
-            <a:off x="653143" y="391886"/>
-            <a:ext cx="2466316" cy="369332"/>
-          </a:xfrm>
-          <a:prstGeom prst="rect">
+        </p:nvSpPr>
+        <p:spPr>
+          <a:xfrm>
+            <a:off x="2497015" y="3130062"/>
+            <a:ext cx="3598985" cy="712176"/>
+          </a:xfrm>
+          <a:prstGeom prst="ellipse">
             <a:avLst/>
           </a:prstGeom>
           <a:noFill/>
-        </p:spPr>
-        <p:txBody>
-          <a:bodyPr wrap="none" rtlCol="0">
-            <a:spAutoFit/>
-          </a:bodyPr>
-          <a:lstStyle/>
-          <a:p>
-            <a:r>
-              <a:rPr lang="en-US" dirty="0"/>
-              <a:t>Control – Endo/Epi = 2.2</a:t>
-            </a:r>
-          </a:p>
-        </p:txBody>
-      </p:sp>
-      <p:sp>
-        <p:nvSpPr>
-          <p:cNvPr id="4" name="TextBox 3">
-            <a:extLst>
-              <a:ext uri="{FF2B5EF4-FFF2-40B4-BE49-F238E27FC236}">
-                <a16:creationId xmlns:a16="http://schemas.microsoft.com/office/drawing/2014/main" id="{8EF7EA75-35FC-32B4-852F-8ABD7C0EE52D}"/>
-              </a:ext>
-            </a:extLst>
-          </p:cNvPr>
-          <p:cNvSpPr txBox="1"/>
-          <p:nvPr/>
-        </p:nvSpPr>
-        <p:spPr>
-          <a:xfrm>
-            <a:off x="10138229" y="224971"/>
-            <a:ext cx="2329543" cy="1754326"/>
-          </a:xfrm>
-          <a:prstGeom prst="rect">
-            <a:avLst/>
-          </a:prstGeom>
-          <a:noFill/>
-        </p:spPr>
-        <p:txBody>
-          <a:bodyPr wrap="square" rtlCol="0">
-            <a:spAutoFit/>
-          </a:bodyPr>
-          <a:lstStyle/>
-          <a:p>
-            <a:r>
-              <a:rPr lang="en-US" dirty="0"/>
-              <a:t>Only change from Hamid’s paper is increasing Rm0 by a factor of 5 </a:t>
-            </a:r>
-          </a:p>
-          <a:p>
-            <a:r>
-              <a:rPr lang="en-US" dirty="0"/>
-              <a:t>- Reference middle resistance </a:t>
-            </a:r>
+          <a:ln w="38100">
+            <a:solidFill>
+              <a:srgbClr val="FF0000"/>
+            </a:solidFill>
+          </a:ln>
+        </p:spPr>
+        <p:style>
+          <a:lnRef idx="2">
+            <a:schemeClr val="accent1">
+              <a:shade val="50000"/>
+            </a:schemeClr>
+          </a:lnRef>
+          <a:fillRef idx="1">
+            <a:schemeClr val="accent1"/>
+          </a:fillRef>
+          <a:effectRef idx="0">
+            <a:schemeClr val="accent1"/>
+          </a:effectRef>
+          <a:fontRef idx="minor">
+            <a:schemeClr val="lt1"/>
+          </a:fontRef>
+        </p:style>
+        <p:txBody>
+          <a:bodyPr rtlCol="0" anchor="ctr"/>
+          <a:lstStyle/>
+          <a:p>
+            <a:pPr algn="ctr"/>
+            <a:endParaRPr lang="en-US"/>
           </a:p>
         </p:txBody>
       </p:sp>
     </p:spTree>
     <p:extLst>
       <p:ext uri="{BB962C8B-B14F-4D97-AF65-F5344CB8AC3E}">
-        <p14:creationId xmlns:p14="http://schemas.microsoft.com/office/powerpoint/2010/main" val="1649632001"/>
+        <p14:creationId xmlns:p14="http://schemas.microsoft.com/office/powerpoint/2010/main" val="1375038739"/>
       </p:ext>
     </p:extLst>
   </p:cSld>
@@ -3731,90 +3627,200 @@
       </p:grpSpPr>
       <p:pic>
         <p:nvPicPr>
-          <p:cNvPr id="3" name="Picture 2" descr="Diagram, schematic&#10;&#10;Description automatically generated">
-            <a:extLst>
-              <a:ext uri="{FF2B5EF4-FFF2-40B4-BE49-F238E27FC236}">
-                <a16:creationId xmlns:a16="http://schemas.microsoft.com/office/drawing/2014/main" id="{2A79ABB7-BC69-CEE7-6A8D-09EFF8E88D8E}"/>
+          <p:cNvPr id="7" name="Picture 6">
+            <a:extLst>
+              <a:ext uri="{FF2B5EF4-FFF2-40B4-BE49-F238E27FC236}">
+                <a16:creationId xmlns:a16="http://schemas.microsoft.com/office/drawing/2014/main" id="{338F4BED-8F99-0AB2-2F0C-1A32CF170C18}"/>
               </a:ext>
             </a:extLst>
           </p:cNvPr>
           <p:cNvPicPr>
-            <a:picLocks noChangeAspect="1"/>
+            <a:picLocks/>
           </p:cNvPicPr>
           <p:nvPr/>
         </p:nvPicPr>
         <p:blipFill>
           <a:blip r:embed="rId2"/>
-          <a:stretch>
-            <a:fillRect/>
-          </a:stretch>
+          <a:srcRect/>
+          <a:stretch/>
         </p:blipFill>
         <p:spPr>
           <a:xfrm>
-            <a:off x="0" y="670857"/>
-            <a:ext cx="12192000" cy="5516286"/>
+            <a:off x="1795922" y="643467"/>
+            <a:ext cx="3390955" cy="2543216"/>
           </a:xfrm>
           <a:prstGeom prst="rect">
             <a:avLst/>
           </a:prstGeom>
         </p:spPr>
       </p:pic>
-      <p:sp>
-        <p:nvSpPr>
-          <p:cNvPr id="4" name="Oval 3">
-            <a:extLst>
-              <a:ext uri="{FF2B5EF4-FFF2-40B4-BE49-F238E27FC236}">
-                <a16:creationId xmlns:a16="http://schemas.microsoft.com/office/drawing/2014/main" id="{94485A85-A2C9-0290-AAD2-C6FDD21AED84}"/>
-              </a:ext>
-            </a:extLst>
-          </p:cNvPr>
-          <p:cNvSpPr/>
+      <p:pic>
+        <p:nvPicPr>
+          <p:cNvPr id="3" name="Picture 2">
+            <a:extLst>
+              <a:ext uri="{FF2B5EF4-FFF2-40B4-BE49-F238E27FC236}">
+                <a16:creationId xmlns:a16="http://schemas.microsoft.com/office/drawing/2014/main" id="{262915D0-861F-372D-5120-913E023C24C6}"/>
+              </a:ext>
+            </a:extLst>
+          </p:cNvPr>
+          <p:cNvPicPr>
+            <a:picLocks/>
+          </p:cNvPicPr>
           <p:nvPr/>
-        </p:nvSpPr>
-        <p:spPr>
-          <a:xfrm>
-            <a:off x="2497015" y="3130062"/>
-            <a:ext cx="3598985" cy="712176"/>
-          </a:xfrm>
-          <a:prstGeom prst="ellipse">
+        </p:nvPicPr>
+        <p:blipFill>
+          <a:blip r:embed="rId3"/>
+          <a:srcRect/>
+          <a:stretch/>
+        </p:blipFill>
+        <p:spPr>
+          <a:xfrm>
+            <a:off x="7009308" y="643467"/>
+            <a:ext cx="3390955" cy="2543216"/>
+          </a:xfrm>
+          <a:prstGeom prst="rect">
+            <a:avLst/>
+          </a:prstGeom>
+        </p:spPr>
+      </p:pic>
+      <p:pic>
+        <p:nvPicPr>
+          <p:cNvPr id="5" name="Picture 4">
+            <a:extLst>
+              <a:ext uri="{FF2B5EF4-FFF2-40B4-BE49-F238E27FC236}">
+                <a16:creationId xmlns:a16="http://schemas.microsoft.com/office/drawing/2014/main" id="{35D27811-CB6F-F3DE-1A30-2A4D84BF31BF}"/>
+              </a:ext>
+            </a:extLst>
+          </p:cNvPr>
+          <p:cNvPicPr>
+            <a:picLocks/>
+          </p:cNvPicPr>
+          <p:nvPr/>
+        </p:nvPicPr>
+        <p:blipFill>
+          <a:blip r:embed="rId4"/>
+          <a:srcRect/>
+          <a:stretch/>
+        </p:blipFill>
+        <p:spPr>
+          <a:xfrm>
+            <a:off x="1794159" y="3671317"/>
+            <a:ext cx="3394481" cy="2545860"/>
+          </a:xfrm>
+          <a:prstGeom prst="rect">
+            <a:avLst/>
+          </a:prstGeom>
+        </p:spPr>
+      </p:pic>
+      <p:pic>
+        <p:nvPicPr>
+          <p:cNvPr id="9" name="Picture 8">
+            <a:extLst>
+              <a:ext uri="{FF2B5EF4-FFF2-40B4-BE49-F238E27FC236}">
+                <a16:creationId xmlns:a16="http://schemas.microsoft.com/office/drawing/2014/main" id="{BAE6C7EC-9FB8-879D-1DF9-9E3E92DCE680}"/>
+              </a:ext>
+            </a:extLst>
+          </p:cNvPr>
+          <p:cNvPicPr>
+            <a:picLocks/>
+          </p:cNvPicPr>
+          <p:nvPr/>
+        </p:nvPicPr>
+        <p:blipFill>
+          <a:blip r:embed="rId5"/>
+          <a:srcRect/>
+          <a:stretch/>
+        </p:blipFill>
+        <p:spPr>
+          <a:xfrm>
+            <a:off x="7002474" y="3671316"/>
+            <a:ext cx="3404624" cy="2553468"/>
+          </a:xfrm>
+          <a:prstGeom prst="rect">
+            <a:avLst/>
+          </a:prstGeom>
+        </p:spPr>
+      </p:pic>
+      <p:sp>
+        <p:nvSpPr>
+          <p:cNvPr id="2" name="TextBox 1">
+            <a:extLst>
+              <a:ext uri="{FF2B5EF4-FFF2-40B4-BE49-F238E27FC236}">
+                <a16:creationId xmlns:a16="http://schemas.microsoft.com/office/drawing/2014/main" id="{48656F87-E8D8-60BD-863E-9FC98FF15636}"/>
+              </a:ext>
+            </a:extLst>
+          </p:cNvPr>
+          <p:cNvSpPr txBox="1"/>
+          <p:nvPr/>
+        </p:nvSpPr>
+        <p:spPr>
+          <a:xfrm>
+            <a:off x="653143" y="391886"/>
+            <a:ext cx="2466316" cy="369332"/>
+          </a:xfrm>
+          <a:prstGeom prst="rect">
             <a:avLst/>
           </a:prstGeom>
           <a:noFill/>
-          <a:ln w="38100">
-            <a:solidFill>
-              <a:srgbClr val="FF0000"/>
-            </a:solidFill>
-          </a:ln>
-        </p:spPr>
-        <p:style>
-          <a:lnRef idx="2">
-            <a:schemeClr val="accent1">
-              <a:shade val="50000"/>
-            </a:schemeClr>
-          </a:lnRef>
-          <a:fillRef idx="1">
-            <a:schemeClr val="accent1"/>
-          </a:fillRef>
-          <a:effectRef idx="0">
-            <a:schemeClr val="accent1"/>
-          </a:effectRef>
-          <a:fontRef idx="minor">
-            <a:schemeClr val="lt1"/>
-          </a:fontRef>
-        </p:style>
-        <p:txBody>
-          <a:bodyPr rtlCol="0" anchor="ctr"/>
-          <a:lstStyle/>
-          <a:p>
-            <a:pPr algn="ctr"/>
-            <a:endParaRPr lang="en-US"/>
+        </p:spPr>
+        <p:txBody>
+          <a:bodyPr wrap="none" rtlCol="0">
+            <a:spAutoFit/>
+          </a:bodyPr>
+          <a:lstStyle/>
+          <a:p>
+            <a:r>
+              <a:rPr lang="en-US" dirty="0"/>
+              <a:t>Control – Endo/Epi = 2.2</a:t>
+            </a:r>
+          </a:p>
+        </p:txBody>
+      </p:sp>
+      <p:sp>
+        <p:nvSpPr>
+          <p:cNvPr id="4" name="TextBox 3">
+            <a:extLst>
+              <a:ext uri="{FF2B5EF4-FFF2-40B4-BE49-F238E27FC236}">
+                <a16:creationId xmlns:a16="http://schemas.microsoft.com/office/drawing/2014/main" id="{8EF7EA75-35FC-32B4-852F-8ABD7C0EE52D}"/>
+              </a:ext>
+            </a:extLst>
+          </p:cNvPr>
+          <p:cNvSpPr txBox="1"/>
+          <p:nvPr/>
+        </p:nvSpPr>
+        <p:spPr>
+          <a:xfrm>
+            <a:off x="10138229" y="224971"/>
+            <a:ext cx="2329543" cy="1754326"/>
+          </a:xfrm>
+          <a:prstGeom prst="rect">
+            <a:avLst/>
+          </a:prstGeom>
+          <a:noFill/>
+        </p:spPr>
+        <p:txBody>
+          <a:bodyPr wrap="square" rtlCol="0">
+            <a:spAutoFit/>
+          </a:bodyPr>
+          <a:lstStyle/>
+          <a:p>
+            <a:r>
+              <a:rPr lang="en-US" dirty="0"/>
+              <a:t>Only change from Hamid’s paper is increasing Rm0 by a factor of 5 </a:t>
+            </a:r>
+          </a:p>
+          <a:p>
+            <a:r>
+              <a:rPr lang="en-US" dirty="0"/>
+              <a:t>- Reference middle resistance </a:t>
+            </a:r>
           </a:p>
         </p:txBody>
       </p:sp>
     </p:spTree>
     <p:extLst>
       <p:ext uri="{BB962C8B-B14F-4D97-AF65-F5344CB8AC3E}">
-        <p14:creationId xmlns:p14="http://schemas.microsoft.com/office/powerpoint/2010/main" val="1375038739"/>
+        <p14:creationId xmlns:p14="http://schemas.microsoft.com/office/powerpoint/2010/main" val="1649632001"/>
       </p:ext>
     </p:extLst>
   </p:cSld>
@@ -4393,6 +4399,268 @@
     <p:extLst>
       <p:ext uri="{BB962C8B-B14F-4D97-AF65-F5344CB8AC3E}">
         <p14:creationId xmlns:p14="http://schemas.microsoft.com/office/powerpoint/2010/main" val="2854624543"/>
+      </p:ext>
+    </p:extLst>
+  </p:cSld>
+  <p:clrMapOvr>
+    <a:masterClrMapping/>
+  </p:clrMapOvr>
+</p:sld>
+</file>
+
+<file path=ppt/slides/slide7.xml><?xml version="1.0" encoding="utf-8"?>
+<p:sld xmlns:a="http://schemas.openxmlformats.org/drawingml/2006/main" xmlns:r="http://schemas.openxmlformats.org/officeDocument/2006/relationships" xmlns:p="http://schemas.openxmlformats.org/presentationml/2006/main">
+  <p:cSld>
+    <p:spTree>
+      <p:nvGrpSpPr>
+        <p:cNvPr id="1" name=""/>
+        <p:cNvGrpSpPr/>
+        <p:nvPr/>
+      </p:nvGrpSpPr>
+      <p:grpSpPr>
+        <a:xfrm>
+          <a:off x="0" y="0"/>
+          <a:ext cx="0" cy="0"/>
+          <a:chOff x="0" y="0"/>
+          <a:chExt cx="0" cy="0"/>
+        </a:xfrm>
+      </p:grpSpPr>
+      <p:pic>
+        <p:nvPicPr>
+          <p:cNvPr id="2" name="Picture 1">
+            <a:extLst>
+              <a:ext uri="{FF2B5EF4-FFF2-40B4-BE49-F238E27FC236}">
+                <a16:creationId xmlns:a16="http://schemas.microsoft.com/office/drawing/2014/main" id="{E4CD0EF4-05CB-77B6-B5D0-62BD40C37A8F}"/>
+              </a:ext>
+            </a:extLst>
+          </p:cNvPr>
+          <p:cNvPicPr>
+            <a:picLocks noChangeAspect="1"/>
+          </p:cNvPicPr>
+          <p:nvPr/>
+        </p:nvPicPr>
+        <p:blipFill>
+          <a:blip r:embed="rId2"/>
+          <a:srcRect/>
+          <a:stretch/>
+        </p:blipFill>
+        <p:spPr>
+          <a:xfrm>
+            <a:off x="3355759" y="-4572"/>
+            <a:ext cx="2292096" cy="1719072"/>
+          </a:xfrm>
+          <a:prstGeom prst="rect">
+            <a:avLst/>
+          </a:prstGeom>
+        </p:spPr>
+      </p:pic>
+      <p:pic>
+        <p:nvPicPr>
+          <p:cNvPr id="3" name="Picture 2">
+            <a:extLst>
+              <a:ext uri="{FF2B5EF4-FFF2-40B4-BE49-F238E27FC236}">
+                <a16:creationId xmlns:a16="http://schemas.microsoft.com/office/drawing/2014/main" id="{510A6CA5-351A-2182-7FB1-6B56C67831F2}"/>
+              </a:ext>
+            </a:extLst>
+          </p:cNvPr>
+          <p:cNvPicPr>
+            <a:picLocks noChangeAspect="1"/>
+          </p:cNvPicPr>
+          <p:nvPr/>
+        </p:nvPicPr>
+        <p:blipFill>
+          <a:blip r:embed="rId3"/>
+          <a:srcRect/>
+          <a:stretch/>
+        </p:blipFill>
+        <p:spPr>
+          <a:xfrm>
+            <a:off x="1069759" y="-4572"/>
+            <a:ext cx="2286000" cy="1714500"/>
+          </a:xfrm>
+          <a:prstGeom prst="rect">
+            <a:avLst/>
+          </a:prstGeom>
+        </p:spPr>
+      </p:pic>
+      <p:pic>
+        <p:nvPicPr>
+          <p:cNvPr id="4" name="Picture 3">
+            <a:extLst>
+              <a:ext uri="{FF2B5EF4-FFF2-40B4-BE49-F238E27FC236}">
+                <a16:creationId xmlns:a16="http://schemas.microsoft.com/office/drawing/2014/main" id="{AAC77B35-4811-7AA3-26CD-7BEC63206645}"/>
+              </a:ext>
+            </a:extLst>
+          </p:cNvPr>
+          <p:cNvPicPr>
+            <a:picLocks noChangeAspect="1"/>
+          </p:cNvPicPr>
+          <p:nvPr/>
+        </p:nvPicPr>
+        <p:blipFill>
+          <a:blip r:embed="rId4"/>
+          <a:srcRect/>
+          <a:stretch/>
+        </p:blipFill>
+        <p:spPr>
+          <a:xfrm>
+            <a:off x="3355759" y="1705356"/>
+            <a:ext cx="2292096" cy="1719072"/>
+          </a:xfrm>
+          <a:prstGeom prst="rect">
+            <a:avLst/>
+          </a:prstGeom>
+        </p:spPr>
+      </p:pic>
+      <p:pic>
+        <p:nvPicPr>
+          <p:cNvPr id="5" name="Picture 4">
+            <a:extLst>
+              <a:ext uri="{FF2B5EF4-FFF2-40B4-BE49-F238E27FC236}">
+                <a16:creationId xmlns:a16="http://schemas.microsoft.com/office/drawing/2014/main" id="{2072E3A9-01C5-55AE-E6A5-07F3C2C587E5}"/>
+              </a:ext>
+            </a:extLst>
+          </p:cNvPr>
+          <p:cNvPicPr>
+            <a:picLocks noChangeAspect="1"/>
+          </p:cNvPicPr>
+          <p:nvPr/>
+        </p:nvPicPr>
+        <p:blipFill>
+          <a:blip r:embed="rId5"/>
+          <a:srcRect/>
+          <a:stretch/>
+        </p:blipFill>
+        <p:spPr>
+          <a:xfrm>
+            <a:off x="1069759" y="1709928"/>
+            <a:ext cx="2286000" cy="1714500"/>
+          </a:xfrm>
+          <a:prstGeom prst="rect">
+            <a:avLst/>
+          </a:prstGeom>
+        </p:spPr>
+      </p:pic>
+      <p:pic>
+        <p:nvPicPr>
+          <p:cNvPr id="6" name="Picture 5">
+            <a:extLst>
+              <a:ext uri="{FF2B5EF4-FFF2-40B4-BE49-F238E27FC236}">
+                <a16:creationId xmlns:a16="http://schemas.microsoft.com/office/drawing/2014/main" id="{060E4729-5817-DC08-677D-4B94179147CE}"/>
+              </a:ext>
+            </a:extLst>
+          </p:cNvPr>
+          <p:cNvPicPr>
+            <a:picLocks noChangeAspect="1"/>
+          </p:cNvPicPr>
+          <p:nvPr/>
+        </p:nvPicPr>
+        <p:blipFill>
+          <a:blip r:embed="rId6"/>
+          <a:srcRect/>
+          <a:stretch/>
+        </p:blipFill>
+        <p:spPr>
+          <a:xfrm>
+            <a:off x="3349664" y="3429000"/>
+            <a:ext cx="2292095" cy="1719072"/>
+          </a:xfrm>
+          <a:prstGeom prst="rect">
+            <a:avLst/>
+          </a:prstGeom>
+        </p:spPr>
+      </p:pic>
+      <p:pic>
+        <p:nvPicPr>
+          <p:cNvPr id="7" name="Picture 6">
+            <a:extLst>
+              <a:ext uri="{FF2B5EF4-FFF2-40B4-BE49-F238E27FC236}">
+                <a16:creationId xmlns:a16="http://schemas.microsoft.com/office/drawing/2014/main" id="{36322CC4-D5A8-593D-A0A3-710ED20760B3}"/>
+              </a:ext>
+            </a:extLst>
+          </p:cNvPr>
+          <p:cNvPicPr>
+            <a:picLocks noChangeAspect="1"/>
+          </p:cNvPicPr>
+          <p:nvPr/>
+        </p:nvPicPr>
+        <p:blipFill>
+          <a:blip r:embed="rId7"/>
+          <a:srcRect/>
+          <a:stretch/>
+        </p:blipFill>
+        <p:spPr>
+          <a:xfrm>
+            <a:off x="1069759" y="3429000"/>
+            <a:ext cx="2286000" cy="1714500"/>
+          </a:xfrm>
+          <a:prstGeom prst="rect">
+            <a:avLst/>
+          </a:prstGeom>
+        </p:spPr>
+      </p:pic>
+      <p:pic>
+        <p:nvPicPr>
+          <p:cNvPr id="8" name="Picture 7">
+            <a:extLst>
+              <a:ext uri="{FF2B5EF4-FFF2-40B4-BE49-F238E27FC236}">
+                <a16:creationId xmlns:a16="http://schemas.microsoft.com/office/drawing/2014/main" id="{7ACE0D7D-D7FD-C2B3-98A7-4292F6616077}"/>
+              </a:ext>
+            </a:extLst>
+          </p:cNvPr>
+          <p:cNvPicPr>
+            <a:picLocks noChangeAspect="1"/>
+          </p:cNvPicPr>
+          <p:nvPr/>
+        </p:nvPicPr>
+        <p:blipFill>
+          <a:blip r:embed="rId8"/>
+          <a:srcRect/>
+          <a:stretch/>
+        </p:blipFill>
+        <p:spPr>
+          <a:xfrm>
+            <a:off x="3343568" y="5134356"/>
+            <a:ext cx="2286000" cy="1714500"/>
+          </a:xfrm>
+          <a:prstGeom prst="rect">
+            <a:avLst/>
+          </a:prstGeom>
+        </p:spPr>
+      </p:pic>
+      <p:pic>
+        <p:nvPicPr>
+          <p:cNvPr id="9" name="Picture 8">
+            <a:extLst>
+              <a:ext uri="{FF2B5EF4-FFF2-40B4-BE49-F238E27FC236}">
+                <a16:creationId xmlns:a16="http://schemas.microsoft.com/office/drawing/2014/main" id="{D27FF055-57D1-3FBF-FBDF-9A118442EC77}"/>
+              </a:ext>
+            </a:extLst>
+          </p:cNvPr>
+          <p:cNvPicPr>
+            <a:picLocks noChangeAspect="1"/>
+          </p:cNvPicPr>
+          <p:nvPr/>
+        </p:nvPicPr>
+        <p:blipFill>
+          <a:blip r:embed="rId9"/>
+          <a:srcRect/>
+          <a:stretch/>
+        </p:blipFill>
+        <p:spPr>
+          <a:xfrm>
+            <a:off x="1069759" y="5152644"/>
+            <a:ext cx="2286000" cy="1714500"/>
+          </a:xfrm>
+          <a:prstGeom prst="rect">
+            <a:avLst/>
+          </a:prstGeom>
+        </p:spPr>
+      </p:pic>
+    </p:spTree>
+    <p:extLst>
+      <p:ext uri="{BB962C8B-B14F-4D97-AF65-F5344CB8AC3E}">
+        <p14:creationId xmlns:p14="http://schemas.microsoft.com/office/powerpoint/2010/main" val="368379565"/>
       </p:ext>
     </p:extLst>
   </p:cSld>

</xml_diff>